<commit_message>
update model.xlsx and example about curves
</commit_message>
<xml_diff>
--- a/unlvr_viz/banner_footer_example/banner.pptx
+++ b/unlvr_viz/banner_footer_example/banner.pptx
@@ -244,7 +244,7 @@
           <a:p>
             <a:fld id="{F47D8D99-AB75-40A3-AAEB-B056E1874216}" type="datetimeFigureOut">
               <a:rPr lang="es-ES" smtClean="0"/>
-              <a:t>21/02/2016</a:t>
+              <a:t>24/02/2016</a:t>
             </a:fld>
             <a:endParaRPr lang="es-ES"/>
           </a:p>
@@ -414,7 +414,7 @@
           <a:p>
             <a:fld id="{F47D8D99-AB75-40A3-AAEB-B056E1874216}" type="datetimeFigureOut">
               <a:rPr lang="es-ES" smtClean="0"/>
-              <a:t>21/02/2016</a:t>
+              <a:t>24/02/2016</a:t>
             </a:fld>
             <a:endParaRPr lang="es-ES"/>
           </a:p>
@@ -594,7 +594,7 @@
           <a:p>
             <a:fld id="{F47D8D99-AB75-40A3-AAEB-B056E1874216}" type="datetimeFigureOut">
               <a:rPr lang="es-ES" smtClean="0"/>
-              <a:t>21/02/2016</a:t>
+              <a:t>24/02/2016</a:t>
             </a:fld>
             <a:endParaRPr lang="es-ES"/>
           </a:p>
@@ -764,7 +764,7 @@
           <a:p>
             <a:fld id="{F47D8D99-AB75-40A3-AAEB-B056E1874216}" type="datetimeFigureOut">
               <a:rPr lang="es-ES" smtClean="0"/>
-              <a:t>21/02/2016</a:t>
+              <a:t>24/02/2016</a:t>
             </a:fld>
             <a:endParaRPr lang="es-ES"/>
           </a:p>
@@ -1010,7 +1010,7 @@
           <a:p>
             <a:fld id="{F47D8D99-AB75-40A3-AAEB-B056E1874216}" type="datetimeFigureOut">
               <a:rPr lang="es-ES" smtClean="0"/>
-              <a:t>21/02/2016</a:t>
+              <a:t>24/02/2016</a:t>
             </a:fld>
             <a:endParaRPr lang="es-ES"/>
           </a:p>
@@ -1242,7 +1242,7 @@
           <a:p>
             <a:fld id="{F47D8D99-AB75-40A3-AAEB-B056E1874216}" type="datetimeFigureOut">
               <a:rPr lang="es-ES" smtClean="0"/>
-              <a:t>21/02/2016</a:t>
+              <a:t>24/02/2016</a:t>
             </a:fld>
             <a:endParaRPr lang="es-ES"/>
           </a:p>
@@ -1609,7 +1609,7 @@
           <a:p>
             <a:fld id="{F47D8D99-AB75-40A3-AAEB-B056E1874216}" type="datetimeFigureOut">
               <a:rPr lang="es-ES" smtClean="0"/>
-              <a:t>21/02/2016</a:t>
+              <a:t>24/02/2016</a:t>
             </a:fld>
             <a:endParaRPr lang="es-ES"/>
           </a:p>
@@ -1727,7 +1727,7 @@
           <a:p>
             <a:fld id="{F47D8D99-AB75-40A3-AAEB-B056E1874216}" type="datetimeFigureOut">
               <a:rPr lang="es-ES" smtClean="0"/>
-              <a:t>21/02/2016</a:t>
+              <a:t>24/02/2016</a:t>
             </a:fld>
             <a:endParaRPr lang="es-ES"/>
           </a:p>
@@ -1822,7 +1822,7 @@
           <a:p>
             <a:fld id="{F47D8D99-AB75-40A3-AAEB-B056E1874216}" type="datetimeFigureOut">
               <a:rPr lang="es-ES" smtClean="0"/>
-              <a:t>21/02/2016</a:t>
+              <a:t>24/02/2016</a:t>
             </a:fld>
             <a:endParaRPr lang="es-ES"/>
           </a:p>
@@ -2099,7 +2099,7 @@
           <a:p>
             <a:fld id="{F47D8D99-AB75-40A3-AAEB-B056E1874216}" type="datetimeFigureOut">
               <a:rPr lang="es-ES" smtClean="0"/>
-              <a:t>21/02/2016</a:t>
+              <a:t>24/02/2016</a:t>
             </a:fld>
             <a:endParaRPr lang="es-ES"/>
           </a:p>
@@ -2352,7 +2352,7 @@
           <a:p>
             <a:fld id="{F47D8D99-AB75-40A3-AAEB-B056E1874216}" type="datetimeFigureOut">
               <a:rPr lang="es-ES" smtClean="0"/>
-              <a:t>21/02/2016</a:t>
+              <a:t>24/02/2016</a:t>
             </a:fld>
             <a:endParaRPr lang="es-ES"/>
           </a:p>
@@ -2565,7 +2565,7 @@
           <a:p>
             <a:fld id="{F47D8D99-AB75-40A3-AAEB-B056E1874216}" type="datetimeFigureOut">
               <a:rPr lang="es-ES" smtClean="0"/>
-              <a:t>21/02/2016</a:t>
+              <a:t>24/02/2016</a:t>
             </a:fld>
             <a:endParaRPr lang="es-ES"/>
           </a:p>
@@ -2970,595 +2970,598 @@
           <a:chExt cx="0" cy="0"/>
         </a:xfrm>
       </p:grpSpPr>
-      <p:grpSp>
-        <p:nvGrpSpPr>
-          <p:cNvPr id="3" name="Group 2"/>
-          <p:cNvGrpSpPr/>
+      <p:pic>
+        <p:nvPicPr>
+          <p:cNvPr id="4" name="Picture 3"/>
+          <p:cNvPicPr>
+            <a:picLocks noChangeAspect="1"/>
+          </p:cNvPicPr>
           <p:nvPr/>
-        </p:nvGrpSpPr>
-        <p:grpSpPr>
+        </p:nvPicPr>
+        <p:blipFill rotWithShape="1">
+          <a:blip r:embed="rId2" cstate="print">
+            <a:extLst>
+              <a:ext uri="{28A0092B-C50C-407E-A947-70E740481C1C}">
+                <a14:useLocalDpi xmlns:a14="http://schemas.microsoft.com/office/drawing/2010/main" val="0"/>
+              </a:ext>
+            </a:extLst>
+          </a:blip>
+          <a:srcRect l="26245"/>
+          <a:stretch/>
+        </p:blipFill>
+        <p:spPr>
           <a:xfrm>
-            <a:off x="0" y="-412532"/>
-            <a:ext cx="12496801" cy="3248328"/>
-            <a:chOff x="-1" y="-420386"/>
-            <a:chExt cx="13808766" cy="3449219"/>
+            <a:off x="0" y="-407690"/>
+            <a:ext cx="12496801" cy="2085578"/>
           </a:xfrm>
-        </p:grpSpPr>
-        <p:pic>
-          <p:nvPicPr>
-            <p:cNvPr id="4" name="Picture 3"/>
-            <p:cNvPicPr>
-              <a:picLocks noChangeAspect="1"/>
-            </p:cNvPicPr>
-            <p:nvPr/>
-          </p:nvPicPr>
-          <p:blipFill rotWithShape="1">
-            <a:blip r:embed="rId2" cstate="print">
-              <a:extLst>
-                <a:ext uri="{28A0092B-C50C-407E-A947-70E740481C1C}">
-                  <a14:useLocalDpi xmlns:a14="http://schemas.microsoft.com/office/drawing/2010/main" val="0"/>
-                </a:ext>
-              </a:extLst>
-            </a:blip>
-            <a:srcRect l="26245"/>
-            <a:stretch/>
-          </p:blipFill>
-          <p:spPr>
-            <a:xfrm>
-              <a:off x="-1" y="-415245"/>
-              <a:ext cx="13808766" cy="2214559"/>
-            </a:xfrm>
-            <a:prstGeom prst="rect">
-              <a:avLst/>
-            </a:prstGeom>
-          </p:spPr>
-        </p:pic>
-        <p:sp>
-          <p:nvSpPr>
-            <p:cNvPr id="8" name="Rounded Rectangle 7"/>
-            <p:cNvSpPr/>
-            <p:nvPr/>
-          </p:nvSpPr>
-          <p:spPr>
-            <a:xfrm>
-              <a:off x="239167" y="832821"/>
-              <a:ext cx="13232797" cy="2196012"/>
-            </a:xfrm>
-            <a:prstGeom prst="roundRect">
-              <a:avLst>
-                <a:gd name="adj" fmla="val 3295"/>
-              </a:avLst>
-            </a:prstGeom>
+          <a:prstGeom prst="rect">
+            <a:avLst/>
+          </a:prstGeom>
+        </p:spPr>
+      </p:pic>
+      <p:sp>
+        <p:nvSpPr>
+          <p:cNvPr id="8" name="Rounded Rectangle 7"/>
+          <p:cNvSpPr/>
+          <p:nvPr/>
+        </p:nvSpPr>
+        <p:spPr>
+          <a:xfrm>
+            <a:off x="200305" y="717469"/>
+            <a:ext cx="11975555" cy="2068111"/>
+          </a:xfrm>
+          <a:prstGeom prst="roundRect">
+            <a:avLst>
+              <a:gd name="adj" fmla="val 3295"/>
+            </a:avLst>
+          </a:prstGeom>
+          <a:solidFill>
+            <a:schemeClr val="bg1"/>
+          </a:solidFill>
+          <a:ln>
             <a:solidFill>
               <a:schemeClr val="bg1"/>
             </a:solidFill>
-            <a:ln>
-              <a:solidFill>
-                <a:schemeClr val="bg1"/>
-              </a:solidFill>
-            </a:ln>
-            <a:effectLst/>
-          </p:spPr>
-          <p:style>
-            <a:lnRef idx="2">
-              <a:schemeClr val="accent1">
-                <a:shade val="50000"/>
-              </a:schemeClr>
-            </a:lnRef>
-            <a:fillRef idx="1">
-              <a:schemeClr val="accent1"/>
-            </a:fillRef>
-            <a:effectRef idx="0">
-              <a:schemeClr val="accent1"/>
-            </a:effectRef>
-            <a:fontRef idx="minor">
-              <a:schemeClr val="lt1"/>
-            </a:fontRef>
-          </p:style>
-          <p:txBody>
-            <a:bodyPr rtlCol="0" anchor="ctr"/>
-            <a:lstStyle/>
-            <a:p>
-              <a:pPr algn="ctr"/>
-              <a:endParaRPr lang="es-ES"/>
-            </a:p>
-          </p:txBody>
-        </p:sp>
-        <p:sp>
-          <p:nvSpPr>
-            <p:cNvPr id="9" name="Rounded Rectangle 8"/>
-            <p:cNvSpPr/>
-            <p:nvPr/>
-          </p:nvSpPr>
-          <p:spPr>
-            <a:xfrm>
-              <a:off x="81000" y="-420386"/>
-              <a:ext cx="8682181" cy="1063569"/>
-            </a:xfrm>
-            <a:custGeom>
-              <a:avLst/>
-              <a:gdLst>
-                <a:gd name="connsiteX0" fmla="*/ 0 w 8796271"/>
-                <a:gd name="connsiteY0" fmla="*/ 184154 h 1104899"/>
-                <a:gd name="connsiteX1" fmla="*/ 184154 w 8796271"/>
-                <a:gd name="connsiteY1" fmla="*/ 0 h 1104899"/>
-                <a:gd name="connsiteX2" fmla="*/ 8612117 w 8796271"/>
-                <a:gd name="connsiteY2" fmla="*/ 0 h 1104899"/>
-                <a:gd name="connsiteX3" fmla="*/ 8796271 w 8796271"/>
-                <a:gd name="connsiteY3" fmla="*/ 184154 h 1104899"/>
-                <a:gd name="connsiteX4" fmla="*/ 8796271 w 8796271"/>
-                <a:gd name="connsiteY4" fmla="*/ 920745 h 1104899"/>
-                <a:gd name="connsiteX5" fmla="*/ 8612117 w 8796271"/>
-                <a:gd name="connsiteY5" fmla="*/ 1104899 h 1104899"/>
-                <a:gd name="connsiteX6" fmla="*/ 184154 w 8796271"/>
-                <a:gd name="connsiteY6" fmla="*/ 1104899 h 1104899"/>
-                <a:gd name="connsiteX7" fmla="*/ 0 w 8796271"/>
-                <a:gd name="connsiteY7" fmla="*/ 920745 h 1104899"/>
-                <a:gd name="connsiteX8" fmla="*/ 0 w 8796271"/>
-                <a:gd name="connsiteY8" fmla="*/ 184154 h 1104899"/>
-                <a:gd name="connsiteX0" fmla="*/ 0 w 8796271"/>
-                <a:gd name="connsiteY0" fmla="*/ 184154 h 1104899"/>
-                <a:gd name="connsiteX1" fmla="*/ 184154 w 8796271"/>
-                <a:gd name="connsiteY1" fmla="*/ 0 h 1104899"/>
-                <a:gd name="connsiteX2" fmla="*/ 8612117 w 8796271"/>
-                <a:gd name="connsiteY2" fmla="*/ 0 h 1104899"/>
-                <a:gd name="connsiteX3" fmla="*/ 8796271 w 8796271"/>
-                <a:gd name="connsiteY3" fmla="*/ 184154 h 1104899"/>
-                <a:gd name="connsiteX4" fmla="*/ 8796271 w 8796271"/>
-                <a:gd name="connsiteY4" fmla="*/ 920745 h 1104899"/>
-                <a:gd name="connsiteX5" fmla="*/ 8573480 w 8796271"/>
-                <a:gd name="connsiteY5" fmla="*/ 641260 h 1104899"/>
-                <a:gd name="connsiteX6" fmla="*/ 184154 w 8796271"/>
-                <a:gd name="connsiteY6" fmla="*/ 1104899 h 1104899"/>
-                <a:gd name="connsiteX7" fmla="*/ 0 w 8796271"/>
-                <a:gd name="connsiteY7" fmla="*/ 920745 h 1104899"/>
-                <a:gd name="connsiteX8" fmla="*/ 0 w 8796271"/>
-                <a:gd name="connsiteY8" fmla="*/ 184154 h 1104899"/>
-                <a:gd name="connsiteX0" fmla="*/ 0 w 8796271"/>
-                <a:gd name="connsiteY0" fmla="*/ 184154 h 1104899"/>
-                <a:gd name="connsiteX1" fmla="*/ 184154 w 8796271"/>
-                <a:gd name="connsiteY1" fmla="*/ 0 h 1104899"/>
-                <a:gd name="connsiteX2" fmla="*/ 8612117 w 8796271"/>
-                <a:gd name="connsiteY2" fmla="*/ 0 h 1104899"/>
-                <a:gd name="connsiteX3" fmla="*/ 8796271 w 8796271"/>
-                <a:gd name="connsiteY3" fmla="*/ 184154 h 1104899"/>
-                <a:gd name="connsiteX4" fmla="*/ 8783392 w 8796271"/>
-                <a:gd name="connsiteY4" fmla="*/ 573015 h 1104899"/>
-                <a:gd name="connsiteX5" fmla="*/ 8573480 w 8796271"/>
-                <a:gd name="connsiteY5" fmla="*/ 641260 h 1104899"/>
-                <a:gd name="connsiteX6" fmla="*/ 184154 w 8796271"/>
-                <a:gd name="connsiteY6" fmla="*/ 1104899 h 1104899"/>
-                <a:gd name="connsiteX7" fmla="*/ 0 w 8796271"/>
-                <a:gd name="connsiteY7" fmla="*/ 920745 h 1104899"/>
-                <a:gd name="connsiteX8" fmla="*/ 0 w 8796271"/>
-                <a:gd name="connsiteY8" fmla="*/ 184154 h 1104899"/>
-                <a:gd name="connsiteX0" fmla="*/ 0 w 8796271"/>
-                <a:gd name="connsiteY0" fmla="*/ 184154 h 1104899"/>
-                <a:gd name="connsiteX1" fmla="*/ 184154 w 8796271"/>
-                <a:gd name="connsiteY1" fmla="*/ 0 h 1104899"/>
-                <a:gd name="connsiteX2" fmla="*/ 8612117 w 8796271"/>
-                <a:gd name="connsiteY2" fmla="*/ 0 h 1104899"/>
-                <a:gd name="connsiteX3" fmla="*/ 8796271 w 8796271"/>
-                <a:gd name="connsiteY3" fmla="*/ 184154 h 1104899"/>
-                <a:gd name="connsiteX4" fmla="*/ 8783392 w 8796271"/>
-                <a:gd name="connsiteY4" fmla="*/ 573015 h 1104899"/>
-                <a:gd name="connsiteX5" fmla="*/ 8547722 w 8796271"/>
-                <a:gd name="connsiteY5" fmla="*/ 718533 h 1104899"/>
-                <a:gd name="connsiteX6" fmla="*/ 184154 w 8796271"/>
-                <a:gd name="connsiteY6" fmla="*/ 1104899 h 1104899"/>
-                <a:gd name="connsiteX7" fmla="*/ 0 w 8796271"/>
-                <a:gd name="connsiteY7" fmla="*/ 920745 h 1104899"/>
-                <a:gd name="connsiteX8" fmla="*/ 0 w 8796271"/>
-                <a:gd name="connsiteY8" fmla="*/ 184154 h 1104899"/>
-                <a:gd name="connsiteX0" fmla="*/ 0 w 8796271"/>
-                <a:gd name="connsiteY0" fmla="*/ 184154 h 1104899"/>
-                <a:gd name="connsiteX1" fmla="*/ 184154 w 8796271"/>
-                <a:gd name="connsiteY1" fmla="*/ 0 h 1104899"/>
-                <a:gd name="connsiteX2" fmla="*/ 8612117 w 8796271"/>
-                <a:gd name="connsiteY2" fmla="*/ 0 h 1104899"/>
-                <a:gd name="connsiteX3" fmla="*/ 8796271 w 8796271"/>
-                <a:gd name="connsiteY3" fmla="*/ 184154 h 1104899"/>
-                <a:gd name="connsiteX4" fmla="*/ 8783392 w 8796271"/>
-                <a:gd name="connsiteY4" fmla="*/ 573015 h 1104899"/>
-                <a:gd name="connsiteX5" fmla="*/ 8560601 w 8796271"/>
-                <a:gd name="connsiteY5" fmla="*/ 898838 h 1104899"/>
-                <a:gd name="connsiteX6" fmla="*/ 184154 w 8796271"/>
-                <a:gd name="connsiteY6" fmla="*/ 1104899 h 1104899"/>
-                <a:gd name="connsiteX7" fmla="*/ 0 w 8796271"/>
-                <a:gd name="connsiteY7" fmla="*/ 920745 h 1104899"/>
-                <a:gd name="connsiteX8" fmla="*/ 0 w 8796271"/>
-                <a:gd name="connsiteY8" fmla="*/ 184154 h 1104899"/>
-                <a:gd name="connsiteX0" fmla="*/ 0 w 8796271"/>
-                <a:gd name="connsiteY0" fmla="*/ 184154 h 1104899"/>
-                <a:gd name="connsiteX1" fmla="*/ 184154 w 8796271"/>
-                <a:gd name="connsiteY1" fmla="*/ 0 h 1104899"/>
-                <a:gd name="connsiteX2" fmla="*/ 8612117 w 8796271"/>
-                <a:gd name="connsiteY2" fmla="*/ 0 h 1104899"/>
-                <a:gd name="connsiteX3" fmla="*/ 8796271 w 8796271"/>
-                <a:gd name="connsiteY3" fmla="*/ 184154 h 1104899"/>
-                <a:gd name="connsiteX4" fmla="*/ 8783392 w 8796271"/>
-                <a:gd name="connsiteY4" fmla="*/ 727561 h 1104899"/>
-                <a:gd name="connsiteX5" fmla="*/ 8560601 w 8796271"/>
-                <a:gd name="connsiteY5" fmla="*/ 898838 h 1104899"/>
-                <a:gd name="connsiteX6" fmla="*/ 184154 w 8796271"/>
-                <a:gd name="connsiteY6" fmla="*/ 1104899 h 1104899"/>
-                <a:gd name="connsiteX7" fmla="*/ 0 w 8796271"/>
-                <a:gd name="connsiteY7" fmla="*/ 920745 h 1104899"/>
-                <a:gd name="connsiteX8" fmla="*/ 0 w 8796271"/>
-                <a:gd name="connsiteY8" fmla="*/ 184154 h 1104899"/>
-                <a:gd name="connsiteX0" fmla="*/ 0 w 9032329"/>
-                <a:gd name="connsiteY0" fmla="*/ 184154 h 1104899"/>
-                <a:gd name="connsiteX1" fmla="*/ 184154 w 9032329"/>
-                <a:gd name="connsiteY1" fmla="*/ 0 h 1104899"/>
-                <a:gd name="connsiteX2" fmla="*/ 8612117 w 9032329"/>
-                <a:gd name="connsiteY2" fmla="*/ 0 h 1104899"/>
-                <a:gd name="connsiteX3" fmla="*/ 9032329 w 9032329"/>
-                <a:gd name="connsiteY3" fmla="*/ 132638 h 1104899"/>
-                <a:gd name="connsiteX4" fmla="*/ 8783392 w 9032329"/>
-                <a:gd name="connsiteY4" fmla="*/ 727561 h 1104899"/>
-                <a:gd name="connsiteX5" fmla="*/ 8560601 w 9032329"/>
-                <a:gd name="connsiteY5" fmla="*/ 898838 h 1104899"/>
-                <a:gd name="connsiteX6" fmla="*/ 184154 w 9032329"/>
-                <a:gd name="connsiteY6" fmla="*/ 1104899 h 1104899"/>
-                <a:gd name="connsiteX7" fmla="*/ 0 w 9032329"/>
-                <a:gd name="connsiteY7" fmla="*/ 920745 h 1104899"/>
-                <a:gd name="connsiteX8" fmla="*/ 0 w 9032329"/>
-                <a:gd name="connsiteY8" fmla="*/ 184154 h 1104899"/>
-                <a:gd name="connsiteX0" fmla="*/ 0 w 9032329"/>
-                <a:gd name="connsiteY0" fmla="*/ 184154 h 1104899"/>
-                <a:gd name="connsiteX1" fmla="*/ 184154 w 9032329"/>
-                <a:gd name="connsiteY1" fmla="*/ 0 h 1104899"/>
-                <a:gd name="connsiteX2" fmla="*/ 8612117 w 9032329"/>
-                <a:gd name="connsiteY2" fmla="*/ 0 h 1104899"/>
-                <a:gd name="connsiteX3" fmla="*/ 9032329 w 9032329"/>
-                <a:gd name="connsiteY3" fmla="*/ 132638 h 1104899"/>
-                <a:gd name="connsiteX4" fmla="*/ 8820665 w 9032329"/>
-                <a:gd name="connsiteY4" fmla="*/ 727561 h 1104899"/>
-                <a:gd name="connsiteX5" fmla="*/ 8560601 w 9032329"/>
-                <a:gd name="connsiteY5" fmla="*/ 898838 h 1104899"/>
-                <a:gd name="connsiteX6" fmla="*/ 184154 w 9032329"/>
-                <a:gd name="connsiteY6" fmla="*/ 1104899 h 1104899"/>
-                <a:gd name="connsiteX7" fmla="*/ 0 w 9032329"/>
-                <a:gd name="connsiteY7" fmla="*/ 920745 h 1104899"/>
-                <a:gd name="connsiteX8" fmla="*/ 0 w 9032329"/>
-                <a:gd name="connsiteY8" fmla="*/ 184154 h 1104899"/>
-                <a:gd name="connsiteX0" fmla="*/ 0 w 9144146"/>
-                <a:gd name="connsiteY0" fmla="*/ 171275 h 1104899"/>
-                <a:gd name="connsiteX1" fmla="*/ 295971 w 9144146"/>
-                <a:gd name="connsiteY1" fmla="*/ 0 h 1104899"/>
-                <a:gd name="connsiteX2" fmla="*/ 8723934 w 9144146"/>
-                <a:gd name="connsiteY2" fmla="*/ 0 h 1104899"/>
-                <a:gd name="connsiteX3" fmla="*/ 9144146 w 9144146"/>
-                <a:gd name="connsiteY3" fmla="*/ 132638 h 1104899"/>
-                <a:gd name="connsiteX4" fmla="*/ 8932482 w 9144146"/>
-                <a:gd name="connsiteY4" fmla="*/ 727561 h 1104899"/>
-                <a:gd name="connsiteX5" fmla="*/ 8672418 w 9144146"/>
-                <a:gd name="connsiteY5" fmla="*/ 898838 h 1104899"/>
-                <a:gd name="connsiteX6" fmla="*/ 295971 w 9144146"/>
-                <a:gd name="connsiteY6" fmla="*/ 1104899 h 1104899"/>
-                <a:gd name="connsiteX7" fmla="*/ 111817 w 9144146"/>
-                <a:gd name="connsiteY7" fmla="*/ 920745 h 1104899"/>
-                <a:gd name="connsiteX8" fmla="*/ 0 w 9144146"/>
-                <a:gd name="connsiteY8" fmla="*/ 171275 h 1104899"/>
-                <a:gd name="connsiteX0" fmla="*/ 0 w 9144146"/>
-                <a:gd name="connsiteY0" fmla="*/ 171275 h 1104899"/>
-                <a:gd name="connsiteX1" fmla="*/ 295971 w 9144146"/>
-                <a:gd name="connsiteY1" fmla="*/ 0 h 1104899"/>
-                <a:gd name="connsiteX2" fmla="*/ 8723934 w 9144146"/>
-                <a:gd name="connsiteY2" fmla="*/ 0 h 1104899"/>
-                <a:gd name="connsiteX3" fmla="*/ 9144146 w 9144146"/>
-                <a:gd name="connsiteY3" fmla="*/ 132638 h 1104899"/>
-                <a:gd name="connsiteX4" fmla="*/ 8994603 w 9144146"/>
-                <a:gd name="connsiteY4" fmla="*/ 714682 h 1104899"/>
-                <a:gd name="connsiteX5" fmla="*/ 8672418 w 9144146"/>
-                <a:gd name="connsiteY5" fmla="*/ 898838 h 1104899"/>
-                <a:gd name="connsiteX6" fmla="*/ 295971 w 9144146"/>
-                <a:gd name="connsiteY6" fmla="*/ 1104899 h 1104899"/>
-                <a:gd name="connsiteX7" fmla="*/ 111817 w 9144146"/>
-                <a:gd name="connsiteY7" fmla="*/ 920745 h 1104899"/>
-                <a:gd name="connsiteX8" fmla="*/ 0 w 9144146"/>
-                <a:gd name="connsiteY8" fmla="*/ 171275 h 1104899"/>
-                <a:gd name="connsiteX0" fmla="*/ 0 w 9144146"/>
-                <a:gd name="connsiteY0" fmla="*/ 171275 h 1104899"/>
-                <a:gd name="connsiteX1" fmla="*/ 295971 w 9144146"/>
-                <a:gd name="connsiteY1" fmla="*/ 0 h 1104899"/>
-                <a:gd name="connsiteX2" fmla="*/ 8723934 w 9144146"/>
-                <a:gd name="connsiteY2" fmla="*/ 0 h 1104899"/>
-                <a:gd name="connsiteX3" fmla="*/ 9144146 w 9144146"/>
-                <a:gd name="connsiteY3" fmla="*/ 132638 h 1104899"/>
-                <a:gd name="connsiteX4" fmla="*/ 8982179 w 9144146"/>
-                <a:gd name="connsiteY4" fmla="*/ 779076 h 1104899"/>
-                <a:gd name="connsiteX5" fmla="*/ 8672418 w 9144146"/>
-                <a:gd name="connsiteY5" fmla="*/ 898838 h 1104899"/>
-                <a:gd name="connsiteX6" fmla="*/ 295971 w 9144146"/>
-                <a:gd name="connsiteY6" fmla="*/ 1104899 h 1104899"/>
-                <a:gd name="connsiteX7" fmla="*/ 111817 w 9144146"/>
-                <a:gd name="connsiteY7" fmla="*/ 920745 h 1104899"/>
-                <a:gd name="connsiteX8" fmla="*/ 0 w 9144146"/>
-                <a:gd name="connsiteY8" fmla="*/ 171275 h 1104899"/>
-              </a:gdLst>
-              <a:ahLst/>
-              <a:cxnLst>
-                <a:cxn ang="0">
-                  <a:pos x="connsiteX0" y="connsiteY0"/>
-                </a:cxn>
-                <a:cxn ang="0">
-                  <a:pos x="connsiteX1" y="connsiteY1"/>
-                </a:cxn>
-                <a:cxn ang="0">
-                  <a:pos x="connsiteX2" y="connsiteY2"/>
-                </a:cxn>
-                <a:cxn ang="0">
-                  <a:pos x="connsiteX3" y="connsiteY3"/>
-                </a:cxn>
-                <a:cxn ang="0">
-                  <a:pos x="connsiteX4" y="connsiteY4"/>
-                </a:cxn>
-                <a:cxn ang="0">
-                  <a:pos x="connsiteX5" y="connsiteY5"/>
-                </a:cxn>
-                <a:cxn ang="0">
-                  <a:pos x="connsiteX6" y="connsiteY6"/>
-                </a:cxn>
-                <a:cxn ang="0">
-                  <a:pos x="connsiteX7" y="connsiteY7"/>
-                </a:cxn>
-                <a:cxn ang="0">
-                  <a:pos x="connsiteX8" y="connsiteY8"/>
-                </a:cxn>
-              </a:cxnLst>
-              <a:rect l="l" t="t" r="r" b="b"/>
-              <a:pathLst>
-                <a:path w="9144146" h="1104899">
-                  <a:moveTo>
-                    <a:pt x="0" y="171275"/>
-                  </a:moveTo>
-                  <a:cubicBezTo>
-                    <a:pt x="0" y="69570"/>
-                    <a:pt x="194266" y="0"/>
-                    <a:pt x="295971" y="0"/>
-                  </a:cubicBezTo>
-                  <a:lnTo>
-                    <a:pt x="8723934" y="0"/>
-                  </a:lnTo>
-                  <a:cubicBezTo>
-                    <a:pt x="8825639" y="0"/>
-                    <a:pt x="9144146" y="30933"/>
-                    <a:pt x="9144146" y="132638"/>
-                  </a:cubicBezTo>
-                  <a:lnTo>
-                    <a:pt x="8982179" y="779076"/>
-                  </a:lnTo>
-                  <a:cubicBezTo>
-                    <a:pt x="8982179" y="880781"/>
-                    <a:pt x="8774123" y="898838"/>
-                    <a:pt x="8672418" y="898838"/>
-                  </a:cubicBezTo>
-                  <a:cubicBezTo>
-                    <a:pt x="5863097" y="898838"/>
-                    <a:pt x="3105292" y="1104899"/>
-                    <a:pt x="295971" y="1104899"/>
-                  </a:cubicBezTo>
-                  <a:cubicBezTo>
-                    <a:pt x="194266" y="1104899"/>
-                    <a:pt x="111817" y="1022450"/>
-                    <a:pt x="111817" y="920745"/>
-                  </a:cubicBezTo>
-                  <a:lnTo>
-                    <a:pt x="0" y="171275"/>
-                  </a:lnTo>
-                  <a:close/>
-                </a:path>
-              </a:pathLst>
-            </a:custGeom>
+          </a:ln>
+          <a:effectLst/>
+        </p:spPr>
+        <p:style>
+          <a:lnRef idx="2">
+            <a:schemeClr val="accent1">
+              <a:shade val="50000"/>
+            </a:schemeClr>
+          </a:lnRef>
+          <a:fillRef idx="1">
+            <a:schemeClr val="accent1"/>
+          </a:fillRef>
+          <a:effectRef idx="0">
+            <a:schemeClr val="accent1"/>
+          </a:effectRef>
+          <a:fontRef idx="minor">
+            <a:schemeClr val="lt1"/>
+          </a:fontRef>
+        </p:style>
+        <p:txBody>
+          <a:bodyPr rtlCol="0" anchor="ctr"/>
+          <a:lstStyle/>
+          <a:p>
+            <a:pPr algn="ctr"/>
+            <a:endParaRPr lang="es-ES"/>
+          </a:p>
+        </p:txBody>
+      </p:sp>
+      <p:sp>
+        <p:nvSpPr>
+          <p:cNvPr id="9" name="Rounded Rectangle 8"/>
+          <p:cNvSpPr/>
+          <p:nvPr/>
+        </p:nvSpPr>
+        <p:spPr>
+          <a:xfrm>
+            <a:off x="73305" y="-412532"/>
+            <a:ext cx="7857291" cy="1001624"/>
+          </a:xfrm>
+          <a:custGeom>
+            <a:avLst/>
+            <a:gdLst>
+              <a:gd name="connsiteX0" fmla="*/ 0 w 8796271"/>
+              <a:gd name="connsiteY0" fmla="*/ 184154 h 1104899"/>
+              <a:gd name="connsiteX1" fmla="*/ 184154 w 8796271"/>
+              <a:gd name="connsiteY1" fmla="*/ 0 h 1104899"/>
+              <a:gd name="connsiteX2" fmla="*/ 8612117 w 8796271"/>
+              <a:gd name="connsiteY2" fmla="*/ 0 h 1104899"/>
+              <a:gd name="connsiteX3" fmla="*/ 8796271 w 8796271"/>
+              <a:gd name="connsiteY3" fmla="*/ 184154 h 1104899"/>
+              <a:gd name="connsiteX4" fmla="*/ 8796271 w 8796271"/>
+              <a:gd name="connsiteY4" fmla="*/ 920745 h 1104899"/>
+              <a:gd name="connsiteX5" fmla="*/ 8612117 w 8796271"/>
+              <a:gd name="connsiteY5" fmla="*/ 1104899 h 1104899"/>
+              <a:gd name="connsiteX6" fmla="*/ 184154 w 8796271"/>
+              <a:gd name="connsiteY6" fmla="*/ 1104899 h 1104899"/>
+              <a:gd name="connsiteX7" fmla="*/ 0 w 8796271"/>
+              <a:gd name="connsiteY7" fmla="*/ 920745 h 1104899"/>
+              <a:gd name="connsiteX8" fmla="*/ 0 w 8796271"/>
+              <a:gd name="connsiteY8" fmla="*/ 184154 h 1104899"/>
+              <a:gd name="connsiteX0" fmla="*/ 0 w 8796271"/>
+              <a:gd name="connsiteY0" fmla="*/ 184154 h 1104899"/>
+              <a:gd name="connsiteX1" fmla="*/ 184154 w 8796271"/>
+              <a:gd name="connsiteY1" fmla="*/ 0 h 1104899"/>
+              <a:gd name="connsiteX2" fmla="*/ 8612117 w 8796271"/>
+              <a:gd name="connsiteY2" fmla="*/ 0 h 1104899"/>
+              <a:gd name="connsiteX3" fmla="*/ 8796271 w 8796271"/>
+              <a:gd name="connsiteY3" fmla="*/ 184154 h 1104899"/>
+              <a:gd name="connsiteX4" fmla="*/ 8796271 w 8796271"/>
+              <a:gd name="connsiteY4" fmla="*/ 920745 h 1104899"/>
+              <a:gd name="connsiteX5" fmla="*/ 8573480 w 8796271"/>
+              <a:gd name="connsiteY5" fmla="*/ 641260 h 1104899"/>
+              <a:gd name="connsiteX6" fmla="*/ 184154 w 8796271"/>
+              <a:gd name="connsiteY6" fmla="*/ 1104899 h 1104899"/>
+              <a:gd name="connsiteX7" fmla="*/ 0 w 8796271"/>
+              <a:gd name="connsiteY7" fmla="*/ 920745 h 1104899"/>
+              <a:gd name="connsiteX8" fmla="*/ 0 w 8796271"/>
+              <a:gd name="connsiteY8" fmla="*/ 184154 h 1104899"/>
+              <a:gd name="connsiteX0" fmla="*/ 0 w 8796271"/>
+              <a:gd name="connsiteY0" fmla="*/ 184154 h 1104899"/>
+              <a:gd name="connsiteX1" fmla="*/ 184154 w 8796271"/>
+              <a:gd name="connsiteY1" fmla="*/ 0 h 1104899"/>
+              <a:gd name="connsiteX2" fmla="*/ 8612117 w 8796271"/>
+              <a:gd name="connsiteY2" fmla="*/ 0 h 1104899"/>
+              <a:gd name="connsiteX3" fmla="*/ 8796271 w 8796271"/>
+              <a:gd name="connsiteY3" fmla="*/ 184154 h 1104899"/>
+              <a:gd name="connsiteX4" fmla="*/ 8783392 w 8796271"/>
+              <a:gd name="connsiteY4" fmla="*/ 573015 h 1104899"/>
+              <a:gd name="connsiteX5" fmla="*/ 8573480 w 8796271"/>
+              <a:gd name="connsiteY5" fmla="*/ 641260 h 1104899"/>
+              <a:gd name="connsiteX6" fmla="*/ 184154 w 8796271"/>
+              <a:gd name="connsiteY6" fmla="*/ 1104899 h 1104899"/>
+              <a:gd name="connsiteX7" fmla="*/ 0 w 8796271"/>
+              <a:gd name="connsiteY7" fmla="*/ 920745 h 1104899"/>
+              <a:gd name="connsiteX8" fmla="*/ 0 w 8796271"/>
+              <a:gd name="connsiteY8" fmla="*/ 184154 h 1104899"/>
+              <a:gd name="connsiteX0" fmla="*/ 0 w 8796271"/>
+              <a:gd name="connsiteY0" fmla="*/ 184154 h 1104899"/>
+              <a:gd name="connsiteX1" fmla="*/ 184154 w 8796271"/>
+              <a:gd name="connsiteY1" fmla="*/ 0 h 1104899"/>
+              <a:gd name="connsiteX2" fmla="*/ 8612117 w 8796271"/>
+              <a:gd name="connsiteY2" fmla="*/ 0 h 1104899"/>
+              <a:gd name="connsiteX3" fmla="*/ 8796271 w 8796271"/>
+              <a:gd name="connsiteY3" fmla="*/ 184154 h 1104899"/>
+              <a:gd name="connsiteX4" fmla="*/ 8783392 w 8796271"/>
+              <a:gd name="connsiteY4" fmla="*/ 573015 h 1104899"/>
+              <a:gd name="connsiteX5" fmla="*/ 8547722 w 8796271"/>
+              <a:gd name="connsiteY5" fmla="*/ 718533 h 1104899"/>
+              <a:gd name="connsiteX6" fmla="*/ 184154 w 8796271"/>
+              <a:gd name="connsiteY6" fmla="*/ 1104899 h 1104899"/>
+              <a:gd name="connsiteX7" fmla="*/ 0 w 8796271"/>
+              <a:gd name="connsiteY7" fmla="*/ 920745 h 1104899"/>
+              <a:gd name="connsiteX8" fmla="*/ 0 w 8796271"/>
+              <a:gd name="connsiteY8" fmla="*/ 184154 h 1104899"/>
+              <a:gd name="connsiteX0" fmla="*/ 0 w 8796271"/>
+              <a:gd name="connsiteY0" fmla="*/ 184154 h 1104899"/>
+              <a:gd name="connsiteX1" fmla="*/ 184154 w 8796271"/>
+              <a:gd name="connsiteY1" fmla="*/ 0 h 1104899"/>
+              <a:gd name="connsiteX2" fmla="*/ 8612117 w 8796271"/>
+              <a:gd name="connsiteY2" fmla="*/ 0 h 1104899"/>
+              <a:gd name="connsiteX3" fmla="*/ 8796271 w 8796271"/>
+              <a:gd name="connsiteY3" fmla="*/ 184154 h 1104899"/>
+              <a:gd name="connsiteX4" fmla="*/ 8783392 w 8796271"/>
+              <a:gd name="connsiteY4" fmla="*/ 573015 h 1104899"/>
+              <a:gd name="connsiteX5" fmla="*/ 8560601 w 8796271"/>
+              <a:gd name="connsiteY5" fmla="*/ 898838 h 1104899"/>
+              <a:gd name="connsiteX6" fmla="*/ 184154 w 8796271"/>
+              <a:gd name="connsiteY6" fmla="*/ 1104899 h 1104899"/>
+              <a:gd name="connsiteX7" fmla="*/ 0 w 8796271"/>
+              <a:gd name="connsiteY7" fmla="*/ 920745 h 1104899"/>
+              <a:gd name="connsiteX8" fmla="*/ 0 w 8796271"/>
+              <a:gd name="connsiteY8" fmla="*/ 184154 h 1104899"/>
+              <a:gd name="connsiteX0" fmla="*/ 0 w 8796271"/>
+              <a:gd name="connsiteY0" fmla="*/ 184154 h 1104899"/>
+              <a:gd name="connsiteX1" fmla="*/ 184154 w 8796271"/>
+              <a:gd name="connsiteY1" fmla="*/ 0 h 1104899"/>
+              <a:gd name="connsiteX2" fmla="*/ 8612117 w 8796271"/>
+              <a:gd name="connsiteY2" fmla="*/ 0 h 1104899"/>
+              <a:gd name="connsiteX3" fmla="*/ 8796271 w 8796271"/>
+              <a:gd name="connsiteY3" fmla="*/ 184154 h 1104899"/>
+              <a:gd name="connsiteX4" fmla="*/ 8783392 w 8796271"/>
+              <a:gd name="connsiteY4" fmla="*/ 727561 h 1104899"/>
+              <a:gd name="connsiteX5" fmla="*/ 8560601 w 8796271"/>
+              <a:gd name="connsiteY5" fmla="*/ 898838 h 1104899"/>
+              <a:gd name="connsiteX6" fmla="*/ 184154 w 8796271"/>
+              <a:gd name="connsiteY6" fmla="*/ 1104899 h 1104899"/>
+              <a:gd name="connsiteX7" fmla="*/ 0 w 8796271"/>
+              <a:gd name="connsiteY7" fmla="*/ 920745 h 1104899"/>
+              <a:gd name="connsiteX8" fmla="*/ 0 w 8796271"/>
+              <a:gd name="connsiteY8" fmla="*/ 184154 h 1104899"/>
+              <a:gd name="connsiteX0" fmla="*/ 0 w 9032329"/>
+              <a:gd name="connsiteY0" fmla="*/ 184154 h 1104899"/>
+              <a:gd name="connsiteX1" fmla="*/ 184154 w 9032329"/>
+              <a:gd name="connsiteY1" fmla="*/ 0 h 1104899"/>
+              <a:gd name="connsiteX2" fmla="*/ 8612117 w 9032329"/>
+              <a:gd name="connsiteY2" fmla="*/ 0 h 1104899"/>
+              <a:gd name="connsiteX3" fmla="*/ 9032329 w 9032329"/>
+              <a:gd name="connsiteY3" fmla="*/ 132638 h 1104899"/>
+              <a:gd name="connsiteX4" fmla="*/ 8783392 w 9032329"/>
+              <a:gd name="connsiteY4" fmla="*/ 727561 h 1104899"/>
+              <a:gd name="connsiteX5" fmla="*/ 8560601 w 9032329"/>
+              <a:gd name="connsiteY5" fmla="*/ 898838 h 1104899"/>
+              <a:gd name="connsiteX6" fmla="*/ 184154 w 9032329"/>
+              <a:gd name="connsiteY6" fmla="*/ 1104899 h 1104899"/>
+              <a:gd name="connsiteX7" fmla="*/ 0 w 9032329"/>
+              <a:gd name="connsiteY7" fmla="*/ 920745 h 1104899"/>
+              <a:gd name="connsiteX8" fmla="*/ 0 w 9032329"/>
+              <a:gd name="connsiteY8" fmla="*/ 184154 h 1104899"/>
+              <a:gd name="connsiteX0" fmla="*/ 0 w 9032329"/>
+              <a:gd name="connsiteY0" fmla="*/ 184154 h 1104899"/>
+              <a:gd name="connsiteX1" fmla="*/ 184154 w 9032329"/>
+              <a:gd name="connsiteY1" fmla="*/ 0 h 1104899"/>
+              <a:gd name="connsiteX2" fmla="*/ 8612117 w 9032329"/>
+              <a:gd name="connsiteY2" fmla="*/ 0 h 1104899"/>
+              <a:gd name="connsiteX3" fmla="*/ 9032329 w 9032329"/>
+              <a:gd name="connsiteY3" fmla="*/ 132638 h 1104899"/>
+              <a:gd name="connsiteX4" fmla="*/ 8820665 w 9032329"/>
+              <a:gd name="connsiteY4" fmla="*/ 727561 h 1104899"/>
+              <a:gd name="connsiteX5" fmla="*/ 8560601 w 9032329"/>
+              <a:gd name="connsiteY5" fmla="*/ 898838 h 1104899"/>
+              <a:gd name="connsiteX6" fmla="*/ 184154 w 9032329"/>
+              <a:gd name="connsiteY6" fmla="*/ 1104899 h 1104899"/>
+              <a:gd name="connsiteX7" fmla="*/ 0 w 9032329"/>
+              <a:gd name="connsiteY7" fmla="*/ 920745 h 1104899"/>
+              <a:gd name="connsiteX8" fmla="*/ 0 w 9032329"/>
+              <a:gd name="connsiteY8" fmla="*/ 184154 h 1104899"/>
+              <a:gd name="connsiteX0" fmla="*/ 0 w 9144146"/>
+              <a:gd name="connsiteY0" fmla="*/ 171275 h 1104899"/>
+              <a:gd name="connsiteX1" fmla="*/ 295971 w 9144146"/>
+              <a:gd name="connsiteY1" fmla="*/ 0 h 1104899"/>
+              <a:gd name="connsiteX2" fmla="*/ 8723934 w 9144146"/>
+              <a:gd name="connsiteY2" fmla="*/ 0 h 1104899"/>
+              <a:gd name="connsiteX3" fmla="*/ 9144146 w 9144146"/>
+              <a:gd name="connsiteY3" fmla="*/ 132638 h 1104899"/>
+              <a:gd name="connsiteX4" fmla="*/ 8932482 w 9144146"/>
+              <a:gd name="connsiteY4" fmla="*/ 727561 h 1104899"/>
+              <a:gd name="connsiteX5" fmla="*/ 8672418 w 9144146"/>
+              <a:gd name="connsiteY5" fmla="*/ 898838 h 1104899"/>
+              <a:gd name="connsiteX6" fmla="*/ 295971 w 9144146"/>
+              <a:gd name="connsiteY6" fmla="*/ 1104899 h 1104899"/>
+              <a:gd name="connsiteX7" fmla="*/ 111817 w 9144146"/>
+              <a:gd name="connsiteY7" fmla="*/ 920745 h 1104899"/>
+              <a:gd name="connsiteX8" fmla="*/ 0 w 9144146"/>
+              <a:gd name="connsiteY8" fmla="*/ 171275 h 1104899"/>
+              <a:gd name="connsiteX0" fmla="*/ 0 w 9144146"/>
+              <a:gd name="connsiteY0" fmla="*/ 171275 h 1104899"/>
+              <a:gd name="connsiteX1" fmla="*/ 295971 w 9144146"/>
+              <a:gd name="connsiteY1" fmla="*/ 0 h 1104899"/>
+              <a:gd name="connsiteX2" fmla="*/ 8723934 w 9144146"/>
+              <a:gd name="connsiteY2" fmla="*/ 0 h 1104899"/>
+              <a:gd name="connsiteX3" fmla="*/ 9144146 w 9144146"/>
+              <a:gd name="connsiteY3" fmla="*/ 132638 h 1104899"/>
+              <a:gd name="connsiteX4" fmla="*/ 8994603 w 9144146"/>
+              <a:gd name="connsiteY4" fmla="*/ 714682 h 1104899"/>
+              <a:gd name="connsiteX5" fmla="*/ 8672418 w 9144146"/>
+              <a:gd name="connsiteY5" fmla="*/ 898838 h 1104899"/>
+              <a:gd name="connsiteX6" fmla="*/ 295971 w 9144146"/>
+              <a:gd name="connsiteY6" fmla="*/ 1104899 h 1104899"/>
+              <a:gd name="connsiteX7" fmla="*/ 111817 w 9144146"/>
+              <a:gd name="connsiteY7" fmla="*/ 920745 h 1104899"/>
+              <a:gd name="connsiteX8" fmla="*/ 0 w 9144146"/>
+              <a:gd name="connsiteY8" fmla="*/ 171275 h 1104899"/>
+              <a:gd name="connsiteX0" fmla="*/ 0 w 9144146"/>
+              <a:gd name="connsiteY0" fmla="*/ 171275 h 1104899"/>
+              <a:gd name="connsiteX1" fmla="*/ 295971 w 9144146"/>
+              <a:gd name="connsiteY1" fmla="*/ 0 h 1104899"/>
+              <a:gd name="connsiteX2" fmla="*/ 8723934 w 9144146"/>
+              <a:gd name="connsiteY2" fmla="*/ 0 h 1104899"/>
+              <a:gd name="connsiteX3" fmla="*/ 9144146 w 9144146"/>
+              <a:gd name="connsiteY3" fmla="*/ 132638 h 1104899"/>
+              <a:gd name="connsiteX4" fmla="*/ 8982179 w 9144146"/>
+              <a:gd name="connsiteY4" fmla="*/ 779076 h 1104899"/>
+              <a:gd name="connsiteX5" fmla="*/ 8672418 w 9144146"/>
+              <a:gd name="connsiteY5" fmla="*/ 898838 h 1104899"/>
+              <a:gd name="connsiteX6" fmla="*/ 295971 w 9144146"/>
+              <a:gd name="connsiteY6" fmla="*/ 1104899 h 1104899"/>
+              <a:gd name="connsiteX7" fmla="*/ 111817 w 9144146"/>
+              <a:gd name="connsiteY7" fmla="*/ 920745 h 1104899"/>
+              <a:gd name="connsiteX8" fmla="*/ 0 w 9144146"/>
+              <a:gd name="connsiteY8" fmla="*/ 171275 h 1104899"/>
+              <a:gd name="connsiteX0" fmla="*/ 0 w 9144146"/>
+              <a:gd name="connsiteY0" fmla="*/ 171275 h 1104899"/>
+              <a:gd name="connsiteX1" fmla="*/ 295971 w 9144146"/>
+              <a:gd name="connsiteY1" fmla="*/ 0 h 1104899"/>
+              <a:gd name="connsiteX2" fmla="*/ 8723934 w 9144146"/>
+              <a:gd name="connsiteY2" fmla="*/ 0 h 1104899"/>
+              <a:gd name="connsiteX3" fmla="*/ 9144146 w 9144146"/>
+              <a:gd name="connsiteY3" fmla="*/ 132638 h 1104899"/>
+              <a:gd name="connsiteX4" fmla="*/ 8982179 w 9144146"/>
+              <a:gd name="connsiteY4" fmla="*/ 779076 h 1104899"/>
+              <a:gd name="connsiteX5" fmla="*/ 8672418 w 9144146"/>
+              <a:gd name="connsiteY5" fmla="*/ 898838 h 1104899"/>
+              <a:gd name="connsiteX6" fmla="*/ 295971 w 9144146"/>
+              <a:gd name="connsiteY6" fmla="*/ 1104899 h 1104899"/>
+              <a:gd name="connsiteX7" fmla="*/ 111817 w 9144146"/>
+              <a:gd name="connsiteY7" fmla="*/ 920745 h 1104899"/>
+              <a:gd name="connsiteX8" fmla="*/ 0 w 9144146"/>
+              <a:gd name="connsiteY8" fmla="*/ 171275 h 1104899"/>
+            </a:gdLst>
+            <a:ahLst/>
+            <a:cxnLst>
+              <a:cxn ang="0">
+                <a:pos x="connsiteX0" y="connsiteY0"/>
+              </a:cxn>
+              <a:cxn ang="0">
+                <a:pos x="connsiteX1" y="connsiteY1"/>
+              </a:cxn>
+              <a:cxn ang="0">
+                <a:pos x="connsiteX2" y="connsiteY2"/>
+              </a:cxn>
+              <a:cxn ang="0">
+                <a:pos x="connsiteX3" y="connsiteY3"/>
+              </a:cxn>
+              <a:cxn ang="0">
+                <a:pos x="connsiteX4" y="connsiteY4"/>
+              </a:cxn>
+              <a:cxn ang="0">
+                <a:pos x="connsiteX5" y="connsiteY5"/>
+              </a:cxn>
+              <a:cxn ang="0">
+                <a:pos x="connsiteX6" y="connsiteY6"/>
+              </a:cxn>
+              <a:cxn ang="0">
+                <a:pos x="connsiteX7" y="connsiteY7"/>
+              </a:cxn>
+              <a:cxn ang="0">
+                <a:pos x="connsiteX8" y="connsiteY8"/>
+              </a:cxn>
+            </a:cxnLst>
+            <a:rect l="l" t="t" r="r" b="b"/>
+            <a:pathLst>
+              <a:path w="9144146" h="1104899">
+                <a:moveTo>
+                  <a:pt x="0" y="171275"/>
+                </a:moveTo>
+                <a:cubicBezTo>
+                  <a:pt x="0" y="69570"/>
+                  <a:pt x="194266" y="0"/>
+                  <a:pt x="295971" y="0"/>
+                </a:cubicBezTo>
+                <a:lnTo>
+                  <a:pt x="8723934" y="0"/>
+                </a:lnTo>
+                <a:cubicBezTo>
+                  <a:pt x="8825639" y="0"/>
+                  <a:pt x="9144146" y="30933"/>
+                  <a:pt x="9144146" y="132638"/>
+                </a:cubicBezTo>
+                <a:lnTo>
+                  <a:pt x="8982179" y="779076"/>
+                </a:lnTo>
+                <a:cubicBezTo>
+                  <a:pt x="8982179" y="880781"/>
+                  <a:pt x="8774123" y="898838"/>
+                  <a:pt x="8672418" y="898838"/>
+                </a:cubicBezTo>
+                <a:cubicBezTo>
+                  <a:pt x="5863097" y="898838"/>
+                  <a:pt x="3105292" y="1104899"/>
+                  <a:pt x="295971" y="1104899"/>
+                </a:cubicBezTo>
+                <a:cubicBezTo>
+                  <a:pt x="194266" y="1104899"/>
+                  <a:pt x="111817" y="1022450"/>
+                  <a:pt x="111817" y="920745"/>
+                </a:cubicBezTo>
+                <a:lnTo>
+                  <a:pt x="0" y="171275"/>
+                </a:lnTo>
+                <a:close/>
+              </a:path>
+            </a:pathLst>
+          </a:custGeom>
+          <a:solidFill>
+            <a:schemeClr val="bg1"/>
+          </a:solidFill>
+          <a:ln>
             <a:solidFill>
               <a:schemeClr val="bg1"/>
             </a:solidFill>
-            <a:ln>
-              <a:solidFill>
-                <a:schemeClr val="bg1"/>
-              </a:solidFill>
-            </a:ln>
-            <a:effectLst>
-              <a:outerShdw blurRad="50800" dist="38100" dir="8100000" algn="tr" rotWithShape="0">
-                <a:prstClr val="black">
-                  <a:alpha val="40000"/>
-                </a:prstClr>
-              </a:outerShdw>
-            </a:effectLst>
-          </p:spPr>
-          <p:style>
-            <a:lnRef idx="2">
-              <a:schemeClr val="accent1">
-                <a:shade val="50000"/>
-              </a:schemeClr>
-            </a:lnRef>
-            <a:fillRef idx="1">
-              <a:schemeClr val="accent1"/>
-            </a:fillRef>
-            <a:effectRef idx="0">
-              <a:schemeClr val="accent1"/>
-            </a:effectRef>
-            <a:fontRef idx="minor">
-              <a:schemeClr val="lt1"/>
-            </a:fontRef>
-          </p:style>
-          <p:txBody>
-            <a:bodyPr rtlCol="0" anchor="ctr"/>
-            <a:lstStyle/>
-            <a:p>
-              <a:pPr algn="ctr"/>
-              <a:endParaRPr lang="es-ES"/>
-            </a:p>
-          </p:txBody>
-        </p:sp>
-        <p:pic>
-          <p:nvPicPr>
-            <p:cNvPr id="12" name="Picture 11"/>
-            <p:cNvPicPr>
-              <a:picLocks noChangeAspect="1"/>
-            </p:cNvPicPr>
-            <p:nvPr/>
-          </p:nvPicPr>
-          <p:blipFill>
-            <a:blip r:embed="rId3" cstate="print">
-              <a:biLevel thresh="25000"/>
-              <a:extLst>
-                <a:ext uri="{28A0092B-C50C-407E-A947-70E740481C1C}">
-                  <a14:useLocalDpi xmlns:a14="http://schemas.microsoft.com/office/drawing/2010/main" val="0"/>
-                </a:ext>
-              </a:extLst>
-            </a:blip>
-            <a:stretch>
-              <a:fillRect/>
-            </a:stretch>
-          </p:blipFill>
-          <p:spPr>
-            <a:xfrm>
-              <a:off x="12384795" y="81745"/>
-              <a:ext cx="464944" cy="541552"/>
-            </a:xfrm>
-            <a:prstGeom prst="rect">
-              <a:avLst/>
-            </a:prstGeom>
-          </p:spPr>
-        </p:pic>
-        <p:pic>
-          <p:nvPicPr>
-            <p:cNvPr id="17" name="Picture 16"/>
-            <p:cNvPicPr>
-              <a:picLocks noChangeAspect="1"/>
-            </p:cNvPicPr>
-            <p:nvPr/>
-          </p:nvPicPr>
-          <p:blipFill>
-            <a:blip r:embed="rId4">
-              <a:extLst>
-                <a:ext uri="{28A0092B-C50C-407E-A947-70E740481C1C}">
-                  <a14:useLocalDpi xmlns:a14="http://schemas.microsoft.com/office/drawing/2010/main" val="0"/>
-                </a:ext>
-              </a:extLst>
-            </a:blip>
-            <a:stretch>
-              <a:fillRect/>
-            </a:stretch>
-          </p:blipFill>
-          <p:spPr>
-            <a:xfrm>
-              <a:off x="344652" y="81745"/>
-              <a:ext cx="504667" cy="407971"/>
-            </a:xfrm>
-            <a:prstGeom prst="rect">
-              <a:avLst/>
-            </a:prstGeom>
-          </p:spPr>
-        </p:pic>
-        <p:cxnSp>
-          <p:nvCxnSpPr>
-            <p:cNvPr id="22" name="Straight Connector 21"/>
-            <p:cNvCxnSpPr/>
-            <p:nvPr/>
-          </p:nvCxnSpPr>
-          <p:spPr>
-            <a:xfrm flipV="1">
-              <a:off x="6650368" y="-225607"/>
-              <a:ext cx="8724" cy="568461"/>
-            </a:xfrm>
-            <a:prstGeom prst="line">
-              <a:avLst/>
-            </a:prstGeom>
-            <a:ln>
-              <a:solidFill>
-                <a:schemeClr val="bg2"/>
-              </a:solidFill>
-            </a:ln>
-          </p:spPr>
-          <p:style>
-            <a:lnRef idx="1">
-              <a:schemeClr val="accent1"/>
-            </a:lnRef>
-            <a:fillRef idx="0">
-              <a:schemeClr val="accent1"/>
-            </a:fillRef>
-            <a:effectRef idx="0">
-              <a:schemeClr val="accent1"/>
-            </a:effectRef>
-            <a:fontRef idx="minor">
-              <a:schemeClr val="tx1"/>
-            </a:fontRef>
-          </p:style>
-        </p:cxnSp>
-        <p:cxnSp>
-          <p:nvCxnSpPr>
-            <p:cNvPr id="23" name="Straight Connector 22"/>
-            <p:cNvCxnSpPr/>
-            <p:nvPr/>
-          </p:nvCxnSpPr>
-          <p:spPr>
-            <a:xfrm flipV="1">
-              <a:off x="5090164" y="-225607"/>
-              <a:ext cx="8724" cy="568461"/>
-            </a:xfrm>
-            <a:prstGeom prst="line">
-              <a:avLst/>
-            </a:prstGeom>
-            <a:ln>
-              <a:solidFill>
-                <a:schemeClr val="bg2"/>
-              </a:solidFill>
-            </a:ln>
-          </p:spPr>
-          <p:style>
-            <a:lnRef idx="1">
-              <a:schemeClr val="accent1"/>
-            </a:lnRef>
-            <a:fillRef idx="0">
-              <a:schemeClr val="accent1"/>
-            </a:fillRef>
-            <a:effectRef idx="0">
-              <a:schemeClr val="accent1"/>
-            </a:effectRef>
-            <a:fontRef idx="minor">
-              <a:schemeClr val="tx1"/>
-            </a:fontRef>
-          </p:style>
-        </p:cxnSp>
-        <p:cxnSp>
-          <p:nvCxnSpPr>
-            <p:cNvPr id="24" name="Straight Connector 23"/>
-            <p:cNvCxnSpPr/>
-            <p:nvPr/>
-          </p:nvCxnSpPr>
-          <p:spPr>
-            <a:xfrm flipV="1">
-              <a:off x="3534321" y="-225607"/>
-              <a:ext cx="8724" cy="568461"/>
-            </a:xfrm>
-            <a:prstGeom prst="line">
-              <a:avLst/>
-            </a:prstGeom>
-            <a:ln>
-              <a:solidFill>
-                <a:schemeClr val="bg2"/>
-              </a:solidFill>
-            </a:ln>
-          </p:spPr>
-          <p:style>
-            <a:lnRef idx="1">
-              <a:schemeClr val="accent1"/>
-            </a:lnRef>
-            <a:fillRef idx="0">
-              <a:schemeClr val="accent1"/>
-            </a:fillRef>
-            <a:effectRef idx="0">
-              <a:schemeClr val="accent1"/>
-            </a:effectRef>
-            <a:fontRef idx="minor">
-              <a:schemeClr val="tx1"/>
-            </a:fontRef>
-          </p:style>
-        </p:cxnSp>
-      </p:grpSp>
+          </a:ln>
+          <a:effectLst>
+            <a:outerShdw blurRad="50800" dist="38100" dir="8100000" algn="tr" rotWithShape="0">
+              <a:prstClr val="black">
+                <a:alpha val="40000"/>
+              </a:prstClr>
+            </a:outerShdw>
+          </a:effectLst>
+        </p:spPr>
+        <p:style>
+          <a:lnRef idx="2">
+            <a:schemeClr val="accent1">
+              <a:shade val="50000"/>
+            </a:schemeClr>
+          </a:lnRef>
+          <a:fillRef idx="1">
+            <a:schemeClr val="accent1"/>
+          </a:fillRef>
+          <a:effectRef idx="0">
+            <a:schemeClr val="accent1"/>
+          </a:effectRef>
+          <a:fontRef idx="minor">
+            <a:schemeClr val="lt1"/>
+          </a:fontRef>
+        </p:style>
+        <p:txBody>
+          <a:bodyPr rtlCol="0" anchor="ctr"/>
+          <a:lstStyle/>
+          <a:p>
+            <a:pPr algn="ctr"/>
+            <a:endParaRPr lang="es-ES"/>
+          </a:p>
+        </p:txBody>
+      </p:sp>
+      <p:pic>
+        <p:nvPicPr>
+          <p:cNvPr id="12" name="Picture 11"/>
+          <p:cNvPicPr>
+            <a:picLocks noChangeAspect="1"/>
+          </p:cNvPicPr>
+          <p:nvPr/>
+        </p:nvPicPr>
+        <p:blipFill>
+          <a:blip r:embed="rId3" cstate="print">
+            <a:biLevel thresh="25000"/>
+            <a:extLst>
+              <a:ext uri="{28A0092B-C50C-407E-A947-70E740481C1C}">
+                <a14:useLocalDpi xmlns:a14="http://schemas.microsoft.com/office/drawing/2010/main" val="0"/>
+              </a:ext>
+            </a:extLst>
+          </a:blip>
+          <a:stretch>
+            <a:fillRect/>
+          </a:stretch>
+        </p:blipFill>
+        <p:spPr>
+          <a:xfrm>
+            <a:off x="11055819" y="-330906"/>
+            <a:ext cx="622305" cy="754290"/>
+          </a:xfrm>
+          <a:prstGeom prst="rect">
+            <a:avLst/>
+          </a:prstGeom>
+        </p:spPr>
+      </p:pic>
+      <p:pic>
+        <p:nvPicPr>
+          <p:cNvPr id="17" name="Picture 16"/>
+          <p:cNvPicPr>
+            <a:picLocks noChangeAspect="1"/>
+          </p:cNvPicPr>
+          <p:nvPr/>
+        </p:nvPicPr>
+        <p:blipFill>
+          <a:blip r:embed="rId4">
+            <a:extLst>
+              <a:ext uri="{28A0092B-C50C-407E-A947-70E740481C1C}">
+                <a14:useLocalDpi xmlns:a14="http://schemas.microsoft.com/office/drawing/2010/main" val="0"/>
+              </a:ext>
+            </a:extLst>
+          </a:blip>
+          <a:stretch>
+            <a:fillRect/>
+          </a:stretch>
+        </p:blipFill>
+        <p:spPr>
+          <a:xfrm>
+            <a:off x="399590" y="-68851"/>
+            <a:ext cx="456719" cy="384210"/>
+          </a:xfrm>
+          <a:prstGeom prst="rect">
+            <a:avLst/>
+          </a:prstGeom>
+        </p:spPr>
+      </p:pic>
+      <p:cxnSp>
+        <p:nvCxnSpPr>
+          <p:cNvPr id="22" name="Straight Connector 21"/>
+          <p:cNvCxnSpPr/>
+          <p:nvPr/>
+        </p:nvCxnSpPr>
+        <p:spPr>
+          <a:xfrm flipV="1">
+            <a:off x="6018520" y="-229097"/>
+            <a:ext cx="7895" cy="535352"/>
+          </a:xfrm>
+          <a:prstGeom prst="line">
+            <a:avLst/>
+          </a:prstGeom>
+          <a:ln>
+            <a:solidFill>
+              <a:schemeClr val="bg2"/>
+            </a:solidFill>
+          </a:ln>
+        </p:spPr>
+        <p:style>
+          <a:lnRef idx="1">
+            <a:schemeClr val="accent1"/>
+          </a:lnRef>
+          <a:fillRef idx="0">
+            <a:schemeClr val="accent1"/>
+          </a:fillRef>
+          <a:effectRef idx="0">
+            <a:schemeClr val="accent1"/>
+          </a:effectRef>
+          <a:fontRef idx="minor">
+            <a:schemeClr val="tx1"/>
+          </a:fontRef>
+        </p:style>
+      </p:cxnSp>
+      <p:cxnSp>
+        <p:nvCxnSpPr>
+          <p:cNvPr id="23" name="Straight Connector 22"/>
+          <p:cNvCxnSpPr/>
+          <p:nvPr/>
+        </p:nvCxnSpPr>
+        <p:spPr>
+          <a:xfrm flipV="1">
+            <a:off x="4606551" y="-229097"/>
+            <a:ext cx="7895" cy="535352"/>
+          </a:xfrm>
+          <a:prstGeom prst="line">
+            <a:avLst/>
+          </a:prstGeom>
+          <a:ln>
+            <a:solidFill>
+              <a:schemeClr val="bg2"/>
+            </a:solidFill>
+          </a:ln>
+        </p:spPr>
+        <p:style>
+          <a:lnRef idx="1">
+            <a:schemeClr val="accent1"/>
+          </a:lnRef>
+          <a:fillRef idx="0">
+            <a:schemeClr val="accent1"/>
+          </a:fillRef>
+          <a:effectRef idx="0">
+            <a:schemeClr val="accent1"/>
+          </a:effectRef>
+          <a:fontRef idx="minor">
+            <a:schemeClr val="tx1"/>
+          </a:fontRef>
+        </p:style>
+      </p:cxnSp>
+      <p:cxnSp>
+        <p:nvCxnSpPr>
+          <p:cNvPr id="24" name="Straight Connector 23"/>
+          <p:cNvCxnSpPr/>
+          <p:nvPr/>
+        </p:nvCxnSpPr>
+        <p:spPr>
+          <a:xfrm flipV="1">
+            <a:off x="3198528" y="-229097"/>
+            <a:ext cx="7895" cy="535352"/>
+          </a:xfrm>
+          <a:prstGeom prst="line">
+            <a:avLst/>
+          </a:prstGeom>
+          <a:ln>
+            <a:solidFill>
+              <a:schemeClr val="bg2"/>
+            </a:solidFill>
+          </a:ln>
+        </p:spPr>
+        <p:style>
+          <a:lnRef idx="1">
+            <a:schemeClr val="accent1"/>
+          </a:lnRef>
+          <a:fillRef idx="0">
+            <a:schemeClr val="accent1"/>
+          </a:fillRef>
+          <a:effectRef idx="0">
+            <a:schemeClr val="accent1"/>
+          </a:effectRef>
+          <a:fontRef idx="minor">
+            <a:schemeClr val="tx1"/>
+          </a:fontRef>
+        </p:style>
+      </p:cxnSp>
     </p:spTree>
     <p:extLst>
       <p:ext uri="{BB962C8B-B14F-4D97-AF65-F5344CB8AC3E}">

</xml_diff>